<commit_message>
Translated the presentation to PowerPoint
</commit_message>
<xml_diff>
--- a/OO Design Workshop.pptx
+++ b/OO Design Workshop.pptx
@@ -5,10 +5,10 @@
     <p:sldMasterId id="2147483648" r:id="rId1"/>
   </p:sldMasterIdLst>
   <p:notesMasterIdLst>
-    <p:notesMasterId r:id="rId44"/>
+    <p:notesMasterId r:id="rId45"/>
   </p:notesMasterIdLst>
   <p:handoutMasterIdLst>
-    <p:handoutMasterId r:id="rId45"/>
+    <p:handoutMasterId r:id="rId46"/>
   </p:handoutMasterIdLst>
   <p:sldIdLst>
     <p:sldId id="256" r:id="rId2"/>
@@ -51,8 +51,9 @@
     <p:sldId id="293" r:id="rId39"/>
     <p:sldId id="294" r:id="rId40"/>
     <p:sldId id="295" r:id="rId41"/>
-    <p:sldId id="296" r:id="rId42"/>
-    <p:sldId id="297" r:id="rId43"/>
+    <p:sldId id="298" r:id="rId42"/>
+    <p:sldId id="296" r:id="rId43"/>
+    <p:sldId id="297" r:id="rId44"/>
   </p:sldIdLst>
   <p:sldSz cx="10080625" cy="7559675" type="screen4x3"/>
   <p:notesSz cx="7559675" cy="10691813"/>
@@ -2908,7 +2909,33 @@
           <a:bodyPr/>
           <a:lstStyle/>
           <a:p>
-            <a:endParaRPr lang="en-GB"/>
+            <a:r>
+              <a:rPr lang="en-GB" dirty="0" smtClean="0"/>
+              <a:t>What is the worst / most-interesting violation of OO principles</a:t>
+            </a:r>
+            <a:r>
+              <a:rPr lang="en-GB" baseline="0" dirty="0" smtClean="0"/>
+              <a:t> you’ve come across?</a:t>
+            </a:r>
+          </a:p>
+          <a:p>
+            <a:r>
+              <a:rPr lang="en-GB" baseline="0" dirty="0" smtClean="0"/>
+              <a:t>	Phrase in terms of coupling/cohesion/SOLID etc.</a:t>
+            </a:r>
+          </a:p>
+          <a:p>
+            <a:r>
+              <a:rPr lang="en-GB" baseline="0" dirty="0" smtClean="0"/>
+              <a:t>What did / would you do to fix it?</a:t>
+            </a:r>
+          </a:p>
+          <a:p>
+            <a:r>
+              <a:rPr lang="en-GB" baseline="0" dirty="0" smtClean="0"/>
+              <a:t>	Why is that better?</a:t>
+            </a:r>
+            <a:endParaRPr lang="en-GB" dirty="0"/>
           </a:p>
         </p:txBody>
       </p:sp>
@@ -9692,53 +9719,57 @@
               <a:buNone/>
             </a:pPr>
             <a:r>
-              <a:rPr lang="en-GB" i="1"/>
+              <a:rPr lang="en-GB" i="1" dirty="0"/>
               <a:t>“Designing software is an exercise in managing complexity”</a:t>
             </a:r>
           </a:p>
           <a:p>
             <a:pPr lvl="0" algn="r">
+              <a:spcAft>
+                <a:spcPts val="0"/>
+              </a:spcAft>
               <a:buNone/>
             </a:pPr>
             <a:r>
-              <a:rPr lang="en-GB" sz="2000"/>
+              <a:rPr lang="en-GB" sz="1600" dirty="0"/>
               <a:t>Jim Reeve - C++ Journal (1992)</a:t>
             </a:r>
           </a:p>
           <a:p>
             <a:pPr lvl="0"/>
             <a:r>
-              <a:rPr lang="en-GB"/>
+              <a:rPr lang="en-GB" sz="2800" dirty="0"/>
               <a:t>Necessary Complexity</a:t>
             </a:r>
           </a:p>
           <a:p>
             <a:pPr lvl="1" rtl="0" hangingPunct="0"/>
             <a:r>
-              <a:rPr lang="en-GB"/>
+              <a:rPr lang="en-GB" sz="2400" dirty="0"/>
               <a:t>Solving hard problems</a:t>
             </a:r>
           </a:p>
           <a:p>
             <a:pPr lvl="0"/>
             <a:r>
-              <a:rPr lang="en-GB"/>
+              <a:rPr lang="en-GB" sz="2800" dirty="0"/>
               <a:t>Accidental Complexity</a:t>
             </a:r>
           </a:p>
           <a:p>
             <a:pPr lvl="1" rtl="0" hangingPunct="0"/>
             <a:r>
-              <a:rPr lang="en-GB"/>
+              <a:rPr lang="en-GB" sz="2400" dirty="0"/>
               <a:t>Gold plating, poor design, premature optimisation, …</a:t>
             </a:r>
           </a:p>
           <a:p>
             <a:pPr lvl="0"/>
             <a:r>
-              <a:rPr lang="en-GB"/>
+              <a:rPr lang="en-GB" sz="2800" dirty="0"/>
               <a:t>Complexity is a cart full of stones, slowing us down</a:t>
             </a:r>
+            <a:endParaRPr lang="en-GB" dirty="0"/>
           </a:p>
         </p:txBody>
       </p:sp>
@@ -10073,8 +10104,28 @@
           <a:p>
             <a:pPr lvl="0"/>
             <a:r>
-              <a:rPr lang="en-GB"/>
-              <a:t>Don't Repeat Yourself</a:t>
+              <a:rPr lang="en-GB" b="1" dirty="0"/>
+              <a:t>D</a:t>
+            </a:r>
+            <a:r>
+              <a:rPr lang="en-GB" dirty="0"/>
+              <a:t>on't </a:t>
+            </a:r>
+            <a:r>
+              <a:rPr lang="en-GB" b="1" dirty="0"/>
+              <a:t>R</a:t>
+            </a:r>
+            <a:r>
+              <a:rPr lang="en-GB" dirty="0"/>
+              <a:t>epeat </a:t>
+            </a:r>
+            <a:r>
+              <a:rPr lang="en-GB" b="1" dirty="0"/>
+              <a:t>Y</a:t>
+            </a:r>
+            <a:r>
+              <a:rPr lang="en-GB" dirty="0"/>
+              <a:t>ourself</a:t>
             </a:r>
           </a:p>
         </p:txBody>
@@ -12846,39 +12897,43 @@
           <a:p>
             <a:pPr lvl="0"/>
             <a:r>
-              <a:rPr lang="en-GB" b="1"/>
+              <a:rPr lang="en-GB" b="1" dirty="0"/>
               <a:t>S</a:t>
             </a:r>
           </a:p>
           <a:p>
             <a:pPr lvl="0"/>
             <a:r>
-              <a:rPr lang="en-GB" b="1"/>
+              <a:rPr lang="en-GB" b="1" dirty="0"/>
               <a:t>O</a:t>
             </a:r>
           </a:p>
           <a:p>
             <a:pPr lvl="0"/>
             <a:r>
-              <a:rPr lang="en-GB" b="1"/>
+              <a:rPr lang="en-GB" b="1" dirty="0" err="1"/>
               <a:t>L</a:t>
             </a:r>
             <a:r>
-              <a:rPr lang="en-GB"/>
-              <a:t>iskov Substitution</a:t>
+              <a:rPr lang="en-GB" dirty="0" err="1"/>
+              <a:t>iskov</a:t>
+            </a:r>
+            <a:r>
+              <a:rPr lang="en-GB" dirty="0"/>
+              <a:t> Substitution</a:t>
             </a:r>
           </a:p>
           <a:p>
             <a:pPr lvl="0"/>
             <a:r>
-              <a:rPr lang="en-GB" b="1"/>
+              <a:rPr lang="en-GB" b="1" dirty="0"/>
               <a:t>I</a:t>
             </a:r>
           </a:p>
           <a:p>
             <a:pPr lvl="0"/>
             <a:r>
-              <a:rPr lang="en-GB" b="1"/>
+              <a:rPr lang="en-GB" b="1" dirty="0"/>
               <a:t>D</a:t>
             </a:r>
           </a:p>
@@ -13099,30 +13154,49 @@
               <a:buNone/>
             </a:pPr>
             <a:r>
-              <a:rPr lang="en-GB" i="1"/>
-              <a:t>"New classes should be logical, consistent extensions of their super-classes"</a:t>
+              <a:rPr lang="en-GB" i="1" dirty="0"/>
+              <a:t>"</a:t>
+            </a:r>
+            <a:r>
+              <a:rPr lang="en-GB" sz="2800" i="1" dirty="0"/>
+              <a:t>New classes should be logical, consistent extensions of their super-classes"</a:t>
             </a:r>
           </a:p>
           <a:p>
             <a:pPr lvl="0" algn="r">
+              <a:spcAft>
+                <a:spcPts val="0"/>
+              </a:spcAft>
               <a:buNone/>
             </a:pPr>
             <a:r>
-              <a:rPr lang="en-GB" sz="2200"/>
-              <a:t>Barbera Liskov (1987)</a:t>
+              <a:rPr lang="en-GB" sz="1600" dirty="0" err="1"/>
+              <a:t>Barbera</a:t>
+            </a:r>
+            <a:r>
+              <a:rPr lang="en-GB" sz="1600" dirty="0"/>
+              <a:t> </a:t>
+            </a:r>
+            <a:r>
+              <a:rPr lang="en-GB" sz="1600" dirty="0" err="1"/>
+              <a:t>Liskov</a:t>
+            </a:r>
+            <a:r>
+              <a:rPr lang="en-GB" sz="1600" dirty="0"/>
+              <a:t> (1987)</a:t>
             </a:r>
           </a:p>
           <a:p>
             <a:pPr lvl="0"/>
             <a:r>
-              <a:rPr lang="en-GB"/>
+              <a:rPr lang="en-GB" sz="2800" dirty="0"/>
               <a:t>The client of an API shouldn't need to know about different implementations</a:t>
             </a:r>
           </a:p>
           <a:p>
             <a:pPr lvl="0"/>
             <a:r>
-              <a:rPr lang="en-GB"/>
+              <a:rPr lang="en-GB" sz="2800" dirty="0"/>
               <a:t>Principle of Least Surprise</a:t>
             </a:r>
           </a:p>
@@ -13457,39 +13531,39 @@
           <a:p>
             <a:pPr lvl="0"/>
             <a:r>
-              <a:rPr lang="en-GB" b="1"/>
+              <a:rPr lang="en-GB" b="1" dirty="0"/>
               <a:t>S</a:t>
             </a:r>
           </a:p>
           <a:p>
             <a:pPr lvl="0"/>
             <a:r>
-              <a:rPr lang="en-GB" b="1"/>
+              <a:rPr lang="en-GB" b="1" dirty="0"/>
               <a:t>O</a:t>
             </a:r>
           </a:p>
           <a:p>
             <a:pPr lvl="0"/>
             <a:r>
-              <a:rPr lang="en-GB" b="1"/>
+              <a:rPr lang="en-GB" b="1" dirty="0"/>
               <a:t>L</a:t>
             </a:r>
           </a:p>
           <a:p>
             <a:pPr lvl="0"/>
             <a:r>
-              <a:rPr lang="en-GB" b="1"/>
+              <a:rPr lang="en-GB" b="1" dirty="0"/>
               <a:t>I</a:t>
             </a:r>
             <a:r>
-              <a:rPr lang="en-GB"/>
+              <a:rPr lang="en-GB" dirty="0"/>
               <a:t>nterface Segregation</a:t>
             </a:r>
           </a:p>
           <a:p>
             <a:pPr lvl="0"/>
             <a:r>
-              <a:rPr lang="en-GB" b="1"/>
+              <a:rPr lang="en-GB" b="1" dirty="0"/>
               <a:t>D</a:t>
             </a:r>
           </a:p>
@@ -13708,21 +13782,37 @@
           <a:p>
             <a:pPr lvl="0"/>
             <a:r>
-              <a:rPr lang="en-GB"/>
-              <a:t>It's better to depend on a small interface than a large one</a:t>
+              <a:rPr lang="en-GB" dirty="0"/>
+              <a:t>It's better to </a:t>
+            </a:r>
+            <a:r>
+              <a:rPr lang="en-GB" u="sng" dirty="0"/>
+              <a:t>depend on</a:t>
+            </a:r>
+            <a:r>
+              <a:rPr lang="en-GB" dirty="0"/>
+              <a:t> a small interface than a large one</a:t>
             </a:r>
           </a:p>
           <a:p>
             <a:pPr lvl="0"/>
             <a:r>
-              <a:rPr lang="en-GB"/>
-              <a:t>It's better to implement a small interface than a large one</a:t>
+              <a:rPr lang="en-GB" dirty="0"/>
+              <a:t>It's better to </a:t>
+            </a:r>
+            <a:r>
+              <a:rPr lang="en-GB" u="sng" dirty="0"/>
+              <a:t>implement</a:t>
+            </a:r>
+            <a:r>
+              <a:rPr lang="en-GB" dirty="0"/>
+              <a:t> a small interface than a large one</a:t>
             </a:r>
           </a:p>
           <a:p>
             <a:pPr lvl="0"/>
             <a:r>
-              <a:rPr lang="en-GB"/>
+              <a:rPr lang="en-GB" dirty="0"/>
               <a:t>Break large interfaces down into smaller ones</a:t>
             </a:r>
           </a:p>
@@ -14057,39 +14147,39 @@
           <a:p>
             <a:pPr lvl="0"/>
             <a:r>
-              <a:rPr lang="en-GB" b="1"/>
+              <a:rPr lang="en-GB" b="1" dirty="0"/>
               <a:t>S</a:t>
             </a:r>
           </a:p>
           <a:p>
             <a:pPr lvl="0"/>
             <a:r>
-              <a:rPr lang="en-GB" b="1"/>
+              <a:rPr lang="en-GB" b="1" dirty="0"/>
               <a:t>O</a:t>
             </a:r>
           </a:p>
           <a:p>
             <a:pPr lvl="0"/>
             <a:r>
-              <a:rPr lang="en-GB" b="1"/>
+              <a:rPr lang="en-GB" b="1" dirty="0"/>
               <a:t>L</a:t>
             </a:r>
           </a:p>
           <a:p>
             <a:pPr lvl="0"/>
             <a:r>
-              <a:rPr lang="en-GB" b="1"/>
+              <a:rPr lang="en-GB" b="1" dirty="0"/>
               <a:t>I</a:t>
             </a:r>
           </a:p>
           <a:p>
             <a:pPr lvl="0"/>
             <a:r>
-              <a:rPr lang="en-GB" b="1"/>
+              <a:rPr lang="en-GB" b="1" dirty="0"/>
               <a:t>D</a:t>
             </a:r>
             <a:r>
-              <a:rPr lang="en-GB" sz="2800"/>
+              <a:rPr lang="en-GB" sz="2800" dirty="0"/>
               <a:t>ependency Inversion</a:t>
             </a:r>
           </a:p>
@@ -14676,7 +14766,7 @@
           <a:p>
             <a:pPr lvl="0"/>
             <a:r>
-              <a:rPr lang="en-GB"/>
+              <a:rPr lang="en-GB" dirty="0"/>
               <a:t>Law Of Demeter</a:t>
             </a:r>
           </a:p>
@@ -14893,45 +14983,118 @@
             </a:lvl9pPr>
           </a:lstStyle>
           <a:p>
-            <a:pPr lvl="0"/>
-            <a:r>
-              <a:rPr lang="en-GB"/>
-              <a:t>Formally, the Law of Demeter for functions requires that a method m of an object O may only invoke the methods of the following kinds of objects:[2]</a:t>
-            </a:r>
-          </a:p>
-          <a:p>
-            <a:pPr lvl="1" rtl="0" hangingPunct="0"/>
-            <a:r>
-              <a:rPr lang="en-GB"/>
-              <a:t>O itself</a:t>
-            </a:r>
-          </a:p>
-          <a:p>
-            <a:pPr lvl="1" rtl="0" hangingPunct="0"/>
-            <a:r>
-              <a:rPr lang="en-GB"/>
-              <a:t>m's parameters</a:t>
-            </a:r>
-          </a:p>
-          <a:p>
-            <a:pPr lvl="1" rtl="0" hangingPunct="0"/>
-            <a:r>
-              <a:rPr lang="en-GB"/>
-              <a:t>Any objects created/instantiated within m</a:t>
-            </a:r>
-          </a:p>
-          <a:p>
-            <a:pPr lvl="1" rtl="0" hangingPunct="0"/>
-            <a:r>
-              <a:rPr lang="en-GB"/>
-              <a:t>O's direct component objects</a:t>
-            </a:r>
-          </a:p>
-          <a:p>
-            <a:pPr lvl="1" rtl="0" hangingPunct="0"/>
-            <a:r>
-              <a:rPr lang="en-GB"/>
-              <a:t>A global variable, accessible by O, in the scope of m</a:t>
+            <a:pPr lvl="0">
+              <a:spcAft>
+                <a:spcPts val="0"/>
+              </a:spcAft>
+            </a:pPr>
+            <a:r>
+              <a:rPr lang="en-GB" sz="2400" dirty="0"/>
+              <a:t>Formally, the Law of Demeter for functions requires that a method </a:t>
+            </a:r>
+            <a:r>
+              <a:rPr lang="en-GB" sz="2400" b="1" dirty="0"/>
+              <a:t>m</a:t>
+            </a:r>
+            <a:r>
+              <a:rPr lang="en-GB" sz="2400" dirty="0"/>
+              <a:t> of an object </a:t>
+            </a:r>
+            <a:r>
+              <a:rPr lang="en-GB" sz="2400" b="1" dirty="0"/>
+              <a:t>O</a:t>
+            </a:r>
+            <a:r>
+              <a:rPr lang="en-GB" sz="2400" dirty="0"/>
+              <a:t> may only invoke the methods of the following kinds of objects</a:t>
+            </a:r>
+            <a:r>
+              <a:rPr lang="en-GB" sz="2400" dirty="0" smtClean="0"/>
+              <a:t>:</a:t>
+            </a:r>
+            <a:endParaRPr lang="en-GB" sz="2400" dirty="0"/>
+          </a:p>
+          <a:p>
+            <a:pPr lvl="1" rtl="0" hangingPunct="0">
+              <a:spcAft>
+                <a:spcPts val="0"/>
+              </a:spcAft>
+            </a:pPr>
+            <a:r>
+              <a:rPr lang="en-GB" sz="2000" b="1" dirty="0"/>
+              <a:t>O</a:t>
+            </a:r>
+            <a:r>
+              <a:rPr lang="en-GB" sz="2000" dirty="0"/>
+              <a:t> itself</a:t>
+            </a:r>
+          </a:p>
+          <a:p>
+            <a:pPr lvl="1" rtl="0" hangingPunct="0">
+              <a:spcAft>
+                <a:spcPts val="0"/>
+              </a:spcAft>
+            </a:pPr>
+            <a:r>
+              <a:rPr lang="en-GB" sz="2000" b="1" dirty="0"/>
+              <a:t>m</a:t>
+            </a:r>
+            <a:r>
+              <a:rPr lang="en-GB" sz="2000" dirty="0"/>
+              <a:t>'s parameters</a:t>
+            </a:r>
+          </a:p>
+          <a:p>
+            <a:pPr lvl="1" rtl="0" hangingPunct="0">
+              <a:spcAft>
+                <a:spcPts val="0"/>
+              </a:spcAft>
+            </a:pPr>
+            <a:r>
+              <a:rPr lang="en-GB" sz="2000" dirty="0"/>
+              <a:t>Any objects created/instantiated within </a:t>
+            </a:r>
+            <a:r>
+              <a:rPr lang="en-GB" sz="2000" b="1" dirty="0"/>
+              <a:t>m</a:t>
+            </a:r>
+          </a:p>
+          <a:p>
+            <a:pPr lvl="1" rtl="0" hangingPunct="0">
+              <a:spcAft>
+                <a:spcPts val="0"/>
+              </a:spcAft>
+            </a:pPr>
+            <a:r>
+              <a:rPr lang="en-GB" sz="2000" b="1" dirty="0"/>
+              <a:t>O</a:t>
+            </a:r>
+            <a:r>
+              <a:rPr lang="en-GB" sz="2000" dirty="0"/>
+              <a:t>'s direct component objects</a:t>
+            </a:r>
+          </a:p>
+          <a:p>
+            <a:pPr lvl="1" rtl="0" hangingPunct="0">
+              <a:spcAft>
+                <a:spcPts val="0"/>
+              </a:spcAft>
+            </a:pPr>
+            <a:r>
+              <a:rPr lang="en-GB" sz="2000" dirty="0"/>
+              <a:t>A global variable, accessible by </a:t>
+            </a:r>
+            <a:r>
+              <a:rPr lang="en-GB" sz="2000" b="1" dirty="0"/>
+              <a:t>O</a:t>
+            </a:r>
+            <a:r>
+              <a:rPr lang="en-GB" sz="2000" dirty="0"/>
+              <a:t>, in the scope of </a:t>
+            </a:r>
+            <a:r>
+              <a:rPr lang="en-GB" sz="2000" b="1" dirty="0"/>
+              <a:t>m</a:t>
             </a:r>
           </a:p>
         </p:txBody>
@@ -15972,63 +16135,141 @@
           <a:p>
             <a:pPr lvl="0"/>
             <a:r>
-              <a:rPr lang="en-GB"/>
+              <a:rPr lang="en-GB" dirty="0"/>
               <a:t>Micro types</a:t>
             </a:r>
           </a:p>
           <a:p>
             <a:pPr lvl="1" rtl="0" hangingPunct="0"/>
             <a:r>
-              <a:rPr lang="en-GB"/>
+              <a:rPr lang="en-GB" dirty="0"/>
               <a:t>Capture the concept of domain types</a:t>
             </a:r>
           </a:p>
           <a:p>
             <a:pPr lvl="1" rtl="0" hangingPunct="0"/>
             <a:r>
-              <a:rPr lang="en-GB"/>
+              <a:rPr lang="en-GB" dirty="0"/>
               <a:t>Strongly-typed</a:t>
             </a:r>
           </a:p>
           <a:p>
             <a:pPr lvl="1" rtl="0" hangingPunct="0"/>
             <a:r>
-              <a:rPr lang="en-GB"/>
+              <a:rPr lang="en-GB" dirty="0"/>
               <a:t>e.g. Order ID</a:t>
             </a:r>
           </a:p>
           <a:p>
-            <a:pPr lvl="1" rtl="0" hangingPunct="0"/>
-            <a:r>
-              <a:rPr lang="en-GB" sz="2400">
+            <a:pPr marL="540000" lvl="1" indent="0" rtl="0" hangingPunct="0">
+              <a:buNone/>
+            </a:pPr>
+            <a:r>
+              <a:rPr lang="en-GB" sz="2400" dirty="0">
                 <a:latin typeface="Courier New" pitchFamily="49"/>
               </a:rPr>
-              <a:t>update(String orderId, String reasonCode)</a:t>
-            </a:r>
-          </a:p>
-          <a:p>
-            <a:pPr lvl="1" rtl="0" hangingPunct="0"/>
-            <a:r>
-              <a:rPr lang="en-GB" sz="2400">
+              <a:t>update(String </a:t>
+            </a:r>
+            <a:r>
+              <a:rPr lang="en-GB" sz="2400" dirty="0" err="1">
                 <a:latin typeface="Courier New" pitchFamily="49"/>
               </a:rPr>
-              <a:t>update(OrderID id, Reason reason)</a:t>
-            </a:r>
-          </a:p>
-          <a:p>
-            <a:pPr lvl="1" rtl="0" hangingPunct="0"/>
-            <a:r>
-              <a:rPr lang="en-GB"/>
-              <a:t>Collections</a:t>
-            </a:r>
-          </a:p>
-          <a:p>
-            <a:pPr lvl="1" rtl="0" hangingPunct="0"/>
-            <a:r>
-              <a:rPr lang="en-GB" sz="2400">
+              <a:t>orderId</a:t>
+            </a:r>
+            <a:r>
+              <a:rPr lang="en-GB" sz="2400" dirty="0">
                 <a:latin typeface="Courier New" pitchFamily="49"/>
               </a:rPr>
-              <a:t>public class Order extends List&lt;Order&gt;{...}</a:t>
+              <a:t>, String </a:t>
+            </a:r>
+            <a:r>
+              <a:rPr lang="en-GB" sz="2400" dirty="0" err="1">
+                <a:latin typeface="Courier New" pitchFamily="49"/>
+              </a:rPr>
+              <a:t>reasonCode</a:t>
+            </a:r>
+            <a:r>
+              <a:rPr lang="en-GB" sz="2400" dirty="0">
+                <a:latin typeface="Courier New" pitchFamily="49"/>
+              </a:rPr>
+              <a:t>)</a:t>
+            </a:r>
+          </a:p>
+          <a:p>
+            <a:pPr marL="540000" lvl="1" indent="0" rtl="0" hangingPunct="0">
+              <a:buNone/>
+            </a:pPr>
+            <a:r>
+              <a:rPr lang="en-GB" sz="2400" dirty="0">
+                <a:latin typeface="Courier New" pitchFamily="49"/>
+              </a:rPr>
+              <a:t>update(</a:t>
+            </a:r>
+            <a:r>
+              <a:rPr lang="en-GB" sz="2400" b="1" dirty="0" err="1">
+                <a:latin typeface="Courier New" pitchFamily="49"/>
+              </a:rPr>
+              <a:t>OrderID</a:t>
+            </a:r>
+            <a:r>
+              <a:rPr lang="en-GB" sz="2400" dirty="0" smtClean="0">
+                <a:latin typeface="Courier New" pitchFamily="49"/>
+              </a:rPr>
+              <a:t> id</a:t>
+            </a:r>
+            <a:r>
+              <a:rPr lang="en-GB" sz="2400" dirty="0">
+                <a:latin typeface="Courier New" pitchFamily="49"/>
+              </a:rPr>
+              <a:t>, </a:t>
+            </a:r>
+            <a:r>
+              <a:rPr lang="en-GB" sz="2400" b="1" dirty="0">
+                <a:latin typeface="Courier New" pitchFamily="49"/>
+              </a:rPr>
+              <a:t>Reason</a:t>
+            </a:r>
+            <a:r>
+              <a:rPr lang="en-GB" sz="2400" dirty="0">
+                <a:latin typeface="Courier New" pitchFamily="49"/>
+              </a:rPr>
+              <a:t> reason)</a:t>
+            </a:r>
+          </a:p>
+          <a:p>
+            <a:pPr lvl="1" rtl="0" hangingPunct="0"/>
+            <a:r>
+              <a:rPr lang="en-GB" dirty="0"/>
+              <a:t>Collections</a:t>
+            </a:r>
+          </a:p>
+          <a:p>
+            <a:pPr marL="540000" lvl="1" indent="0" rtl="0" hangingPunct="0">
+              <a:buNone/>
+            </a:pPr>
+            <a:r>
+              <a:rPr lang="en-GB" sz="2400" dirty="0">
+                <a:latin typeface="Courier New" pitchFamily="49"/>
+              </a:rPr>
+              <a:t>public class </a:t>
+            </a:r>
+            <a:r>
+              <a:rPr lang="en-GB" sz="2400" b="1" dirty="0" smtClean="0">
+                <a:latin typeface="Courier New" pitchFamily="49"/>
+              </a:rPr>
+              <a:t>Orders</a:t>
+            </a:r>
+            <a:r>
+              <a:rPr lang="en-GB" sz="2400" dirty="0" smtClean="0">
+                <a:latin typeface="Courier New" pitchFamily="49"/>
+              </a:rPr>
+              <a:t> </a:t>
+            </a:r>
+            <a:r>
+              <a:rPr lang="en-GB" sz="2400" dirty="0">
+                <a:latin typeface="Courier New" pitchFamily="49"/>
+              </a:rPr>
+              <a:t>extends List&lt;Order&gt;{...}</a:t>
             </a:r>
           </a:p>
         </p:txBody>
@@ -16143,7 +16384,7 @@
               <a:buNone/>
             </a:pPr>
             <a:r>
-              <a:rPr lang="en-GB"/>
+              <a:rPr lang="en-GB" dirty="0"/>
               <a:t>Practices</a:t>
             </a:r>
           </a:p>
@@ -16355,66 +16596,106 @@
             </a:lvl9pPr>
           </a:lstStyle>
           <a:p>
-            <a:pPr lvl="0"/>
-            <a:r>
-              <a:rPr lang="en-GB"/>
+            <a:pPr lvl="0">
+              <a:spcAft>
+                <a:spcPts val="600"/>
+              </a:spcAft>
+            </a:pPr>
+            <a:r>
+              <a:rPr lang="en-GB" sz="2800" dirty="0"/>
               <a:t>Design Patterns</a:t>
             </a:r>
           </a:p>
           <a:p>
-            <a:pPr lvl="1" rtl="0" hangingPunct="0"/>
-            <a:r>
-              <a:rPr lang="en-GB"/>
+            <a:pPr lvl="1" rtl="0" hangingPunct="0">
+              <a:spcAft>
+                <a:spcPts val="600"/>
+              </a:spcAft>
+            </a:pPr>
+            <a:r>
+              <a:rPr lang="en-GB" sz="2400" dirty="0"/>
               <a:t>Solutions for common problems</a:t>
             </a:r>
           </a:p>
           <a:p>
-            <a:pPr lvl="2" rtl="0" hangingPunct="0"/>
-            <a:r>
-              <a:rPr lang="en-GB"/>
+            <a:pPr lvl="2" rtl="0" hangingPunct="0">
+              <a:spcAft>
+                <a:spcPts val="600"/>
+              </a:spcAft>
+            </a:pPr>
+            <a:r>
+              <a:rPr lang="en-GB" sz="2000" dirty="0"/>
               <a:t>Encapsulate variations</a:t>
             </a:r>
           </a:p>
           <a:p>
-            <a:pPr lvl="1" rtl="0" hangingPunct="0"/>
-            <a:r>
-              <a:rPr lang="en-GB"/>
+            <a:pPr lvl="1" rtl="0" hangingPunct="0">
+              <a:spcAft>
+                <a:spcPts val="600"/>
+              </a:spcAft>
+            </a:pPr>
+            <a:r>
+              <a:rPr lang="en-GB" sz="2400" dirty="0"/>
               <a:t>A common language / shorthand</a:t>
             </a:r>
           </a:p>
           <a:p>
-            <a:pPr lvl="1" rtl="0" hangingPunct="0"/>
-            <a:endParaRPr lang="en-GB"/>
-          </a:p>
-          <a:p>
-            <a:pPr lvl="1" rtl="0" hangingPunct="0"/>
-            <a:r>
-              <a:rPr lang="en-GB"/>
+            <a:pPr lvl="1" rtl="0" hangingPunct="0">
+              <a:spcAft>
+                <a:spcPts val="600"/>
+              </a:spcAft>
+            </a:pPr>
+            <a:endParaRPr lang="en-GB" sz="2400" dirty="0"/>
+          </a:p>
+          <a:p>
+            <a:pPr lvl="1" rtl="0" hangingPunct="0">
+              <a:spcAft>
+                <a:spcPts val="600"/>
+              </a:spcAft>
+            </a:pPr>
+            <a:r>
+              <a:rPr lang="en-GB" sz="2400" dirty="0"/>
               <a:t>BUT</a:t>
             </a:r>
           </a:p>
           <a:p>
-            <a:pPr lvl="1" rtl="0" hangingPunct="0"/>
-            <a:endParaRPr lang="en-GB"/>
-          </a:p>
-          <a:p>
-            <a:pPr lvl="1" rtl="0" hangingPunct="0"/>
-            <a:r>
-              <a:rPr lang="en-GB"/>
+            <a:pPr lvl="1" rtl="0" hangingPunct="0">
+              <a:spcAft>
+                <a:spcPts val="600"/>
+              </a:spcAft>
+            </a:pPr>
+            <a:endParaRPr lang="en-GB" sz="2400" dirty="0"/>
+          </a:p>
+          <a:p>
+            <a:pPr lvl="1" rtl="0" hangingPunct="0">
+              <a:spcAft>
+                <a:spcPts val="600"/>
+              </a:spcAft>
+            </a:pPr>
+            <a:r>
+              <a:rPr lang="en-GB" sz="2400" dirty="0"/>
               <a:t>They're not where you start, they're where you finish</a:t>
             </a:r>
           </a:p>
           <a:p>
-            <a:pPr lvl="1" rtl="0" hangingPunct="0"/>
-            <a:r>
-              <a:rPr lang="en-GB"/>
+            <a:pPr lvl="1" rtl="0" hangingPunct="0">
+              <a:spcAft>
+                <a:spcPts val="600"/>
+              </a:spcAft>
+            </a:pPr>
+            <a:r>
+              <a:rPr lang="en-GB" sz="2400" dirty="0"/>
               <a:t>Refactor to patterns</a:t>
             </a:r>
           </a:p>
           <a:p>
-            <a:pPr lvl="2" rtl="0" hangingPunct="0"/>
-            <a:r>
-              <a:rPr lang="en-GB"/>
+            <a:pPr lvl="2" rtl="0" hangingPunct="0">
+              <a:spcAft>
+                <a:spcPts val="600"/>
+              </a:spcAft>
+            </a:pPr>
+            <a:r>
+              <a:rPr lang="en-GB" sz="2000" dirty="0"/>
               <a:t>in response to code-smells</a:t>
             </a:r>
           </a:p>
@@ -17127,70 +17408,70 @@
           <a:p>
             <a:pPr lvl="0"/>
             <a:r>
-              <a:rPr lang="en-GB"/>
+              <a:rPr lang="en-GB" sz="2800" dirty="0"/>
               <a:t>Structural</a:t>
             </a:r>
           </a:p>
           <a:p>
             <a:pPr lvl="1" rtl="0" hangingPunct="0"/>
             <a:r>
-              <a:rPr lang="en-GB"/>
+              <a:rPr lang="en-GB" sz="2400" dirty="0"/>
               <a:t>Adaptor</a:t>
             </a:r>
           </a:p>
           <a:p>
             <a:pPr lvl="2" rtl="0" hangingPunct="0"/>
             <a:r>
-              <a:rPr lang="en-GB"/>
+              <a:rPr lang="en-GB" sz="2000" dirty="0"/>
               <a:t>Translate between different protocols (encapsulate the differences)</a:t>
             </a:r>
           </a:p>
           <a:p>
             <a:pPr lvl="1" rtl="0" hangingPunct="0"/>
             <a:r>
-              <a:rPr lang="en-GB"/>
+              <a:rPr lang="en-GB" sz="2400" dirty="0"/>
               <a:t>Facade</a:t>
             </a:r>
           </a:p>
           <a:p>
             <a:pPr lvl="2" rtl="0" hangingPunct="0"/>
             <a:r>
-              <a:rPr lang="en-GB"/>
+              <a:rPr lang="en-GB" sz="2000" dirty="0"/>
               <a:t>Hide a complex API behind a simpler one</a:t>
             </a:r>
           </a:p>
           <a:p>
             <a:pPr lvl="1" rtl="0" hangingPunct="0"/>
             <a:r>
-              <a:rPr lang="en-GB"/>
+              <a:rPr lang="en-GB" sz="2400" dirty="0"/>
               <a:t>Decorator</a:t>
             </a:r>
           </a:p>
           <a:p>
             <a:pPr lvl="2" rtl="0" hangingPunct="0"/>
             <a:r>
-              <a:rPr lang="en-GB"/>
+              <a:rPr lang="en-GB" sz="2000" dirty="0"/>
               <a:t>Wrap one object in another of the same type and add behaviour</a:t>
             </a:r>
           </a:p>
           <a:p>
             <a:pPr lvl="3" rtl="0" hangingPunct="0"/>
             <a:r>
-              <a:rPr lang="en-GB"/>
+              <a:rPr lang="en-GB" sz="1800" dirty="0"/>
               <a:t>Java IO libraries</a:t>
             </a:r>
           </a:p>
           <a:p>
             <a:pPr lvl="1" rtl="0" hangingPunct="0"/>
             <a:r>
-              <a:rPr lang="en-GB"/>
+              <a:rPr lang="en-GB" sz="2400" dirty="0"/>
               <a:t>Composite</a:t>
             </a:r>
           </a:p>
           <a:p>
             <a:pPr lvl="2" rtl="0" hangingPunct="0"/>
             <a:r>
-              <a:rPr lang="en-GB"/>
+              <a:rPr lang="en-GB" sz="2000" dirty="0"/>
               <a:t>Homogeneous tree structures e.g. Files/Directories</a:t>
             </a:r>
           </a:p>
@@ -20258,7 +20539,7 @@
               <a:buNone/>
             </a:pPr>
             <a:r>
-              <a:rPr lang="en-GB"/>
+              <a:rPr lang="en-GB" dirty="0"/>
               <a:t>Exercise 5</a:t>
             </a:r>
           </a:p>
@@ -20267,9 +20548,10 @@
               <a:buNone/>
             </a:pPr>
             <a:r>
-              <a:rPr lang="en-GB"/>
-              <a:t>????????</a:t>
-            </a:r>
+              <a:rPr lang="en-GB" dirty="0" smtClean="0"/>
+              <a:t>Group Therapy</a:t>
+            </a:r>
+            <a:endParaRPr lang="en-GB" dirty="0"/>
           </a:p>
         </p:txBody>
       </p:sp>
@@ -20595,72 +20877,112 @@
             </a:lvl9pPr>
           </a:lstStyle>
           <a:p>
-            <a:pPr lvl="0"/>
-            <a:r>
-              <a:rPr lang="en-GB"/>
+            <a:pPr lvl="0">
+              <a:spcAft>
+                <a:spcPts val="600"/>
+              </a:spcAft>
+            </a:pPr>
+            <a:r>
+              <a:rPr lang="en-GB" dirty="0"/>
               <a:t>It will never be perfect</a:t>
             </a:r>
           </a:p>
           <a:p>
-            <a:pPr lvl="1" rtl="0" hangingPunct="0"/>
-            <a:r>
-              <a:rPr lang="en-GB"/>
+            <a:pPr lvl="1" rtl="0" hangingPunct="0">
+              <a:spcAft>
+                <a:spcPts val="600"/>
+              </a:spcAft>
+            </a:pPr>
+            <a:r>
+              <a:rPr lang="en-GB" dirty="0"/>
               <a:t>The key to good design is knowing when to stop</a:t>
             </a:r>
           </a:p>
           <a:p>
-            <a:pPr lvl="1" rtl="0" hangingPunct="0"/>
-            <a:r>
-              <a:rPr lang="en-GB"/>
+            <a:pPr lvl="1" rtl="0" hangingPunct="0">
+              <a:spcAft>
+                <a:spcPts val="600"/>
+              </a:spcAft>
+            </a:pPr>
+            <a:r>
+              <a:rPr lang="en-GB" dirty="0"/>
               <a:t>Protect yourself with Tests</a:t>
             </a:r>
           </a:p>
           <a:p>
-            <a:pPr lvl="2" rtl="0" hangingPunct="0"/>
-            <a:r>
-              <a:rPr lang="en-GB"/>
+            <a:pPr lvl="2" rtl="0" hangingPunct="0">
+              <a:spcAft>
+                <a:spcPts val="600"/>
+              </a:spcAft>
+            </a:pPr>
+            <a:r>
+              <a:rPr lang="en-GB" dirty="0"/>
               <a:t>Accept change</a:t>
             </a:r>
           </a:p>
           <a:p>
-            <a:pPr lvl="0"/>
-            <a:r>
-              <a:rPr lang="en-GB"/>
+            <a:pPr lvl="0">
+              <a:spcAft>
+                <a:spcPts val="600"/>
+              </a:spcAft>
+            </a:pPr>
+            <a:r>
+              <a:rPr lang="en-GB" dirty="0"/>
               <a:t>Principles apply at different scales</a:t>
             </a:r>
           </a:p>
           <a:p>
-            <a:pPr lvl="1" rtl="0" hangingPunct="0"/>
-            <a:r>
-              <a:rPr lang="en-GB"/>
+            <a:pPr lvl="1" rtl="0" hangingPunct="0">
+              <a:spcAft>
+                <a:spcPts val="600"/>
+              </a:spcAft>
+            </a:pPr>
+            <a:r>
+              <a:rPr lang="en-GB" dirty="0"/>
               <a:t>As below, so above</a:t>
             </a:r>
           </a:p>
           <a:p>
-            <a:pPr lvl="1" rtl="0" hangingPunct="0"/>
-            <a:r>
-              <a:rPr lang="en-GB"/>
+            <a:pPr lvl="1" rtl="0" hangingPunct="0">
+              <a:spcAft>
+                <a:spcPts val="600"/>
+              </a:spcAft>
+            </a:pPr>
+            <a:r>
+              <a:rPr lang="en-GB" dirty="0"/>
               <a:t>Intra-module</a:t>
             </a:r>
           </a:p>
           <a:p>
-            <a:pPr lvl="1" rtl="0" hangingPunct="0"/>
-            <a:r>
-              <a:rPr lang="en-GB"/>
+            <a:pPr lvl="1" rtl="0" hangingPunct="0">
+              <a:spcAft>
+                <a:spcPts val="600"/>
+              </a:spcAft>
+            </a:pPr>
+            <a:r>
+              <a:rPr lang="en-GB" dirty="0"/>
               <a:t>Inter-module/Intra-system</a:t>
             </a:r>
           </a:p>
           <a:p>
-            <a:pPr lvl="1" rtl="0" hangingPunct="0"/>
-            <a:r>
-              <a:rPr lang="en-GB"/>
+            <a:pPr lvl="1" rtl="0" hangingPunct="0">
+              <a:spcAft>
+                <a:spcPts val="600"/>
+              </a:spcAft>
+            </a:pPr>
+            <a:r>
+              <a:rPr lang="en-GB" dirty="0"/>
               <a:t>Inter-System</a:t>
             </a:r>
           </a:p>
           <a:p>
-            <a:pPr lvl="1" rtl="0" hangingPunct="0"/>
-            <a:r>
-              <a:rPr lang="en-GB"/>
+            <a:pPr lvl="1" rtl="0" hangingPunct="0">
+              <a:spcAft>
+                <a:spcPts val="600"/>
+              </a:spcAft>
+            </a:pPr>
+            <a:r>
+              <a:rPr lang="en-GB" dirty="0"/>
               <a:t>B2B</a:t>
             </a:r>
           </a:p>
@@ -21754,29 +22076,38 @@
             <a:pPr lvl="0">
               <a:buNone/>
             </a:pPr>
-            <a:endParaRPr lang="en-GB"/>
+            <a:endParaRPr lang="en-GB" dirty="0"/>
           </a:p>
           <a:p>
             <a:pPr lvl="0">
               <a:buNone/>
             </a:pPr>
-            <a:endParaRPr lang="en-GB"/>
+            <a:endParaRPr lang="en-GB" dirty="0"/>
           </a:p>
           <a:p>
             <a:pPr lvl="0">
               <a:buNone/>
             </a:pPr>
             <a:r>
-              <a:rPr lang="en-GB"/>
-              <a:t>Always code as if the person who ends up maintaining your code is a violent psychopath who knows where you live.</a:t>
-            </a:r>
+              <a:rPr lang="en-GB" dirty="0" smtClean="0"/>
+              <a:t>“Always </a:t>
+            </a:r>
+            <a:r>
+              <a:rPr lang="en-GB" dirty="0"/>
+              <a:t>code as if the person who ends up maintaining your code is a violent psychopath who knows where you live</a:t>
+            </a:r>
+            <a:r>
+              <a:rPr lang="en-GB" dirty="0" smtClean="0"/>
+              <a:t>.”</a:t>
+            </a:r>
+            <a:endParaRPr lang="en-GB" dirty="0"/>
           </a:p>
           <a:p>
             <a:pPr lvl="0" algn="r">
               <a:buNone/>
             </a:pPr>
             <a:r>
-              <a:rPr lang="en-GB" i="1"/>
+              <a:rPr lang="en-GB" i="1" dirty="0"/>
               <a:t>Ward Cunningham</a:t>
             </a:r>
           </a:p>
@@ -21806,6 +22137,113 @@
 </file>
 
 <file path=ppt/slides/slide41.xml><?xml version="1.0" encoding="utf-8"?>
+<p:sld xmlns:a="http://schemas.openxmlformats.org/drawingml/2006/main" xmlns:r="http://schemas.openxmlformats.org/officeDocument/2006/relationships" xmlns:p="http://schemas.openxmlformats.org/presentationml/2006/main">
+  <p:cSld>
+    <p:spTree>
+      <p:nvGrpSpPr>
+        <p:cNvPr id="1" name=""/>
+        <p:cNvGrpSpPr/>
+        <p:nvPr/>
+      </p:nvGrpSpPr>
+      <p:grpSpPr>
+        <a:xfrm>
+          <a:off x="0" y="0"/>
+          <a:ext cx="0" cy="0"/>
+          <a:chOff x="0" y="0"/>
+          <a:chExt cx="0" cy="0"/>
+        </a:xfrm>
+      </p:grpSpPr>
+      <p:sp>
+        <p:nvSpPr>
+          <p:cNvPr id="2" name="Title 1"/>
+          <p:cNvSpPr>
+            <a:spLocks noGrp="1"/>
+          </p:cNvSpPr>
+          <p:nvPr>
+            <p:ph type="title"/>
+          </p:nvPr>
+        </p:nvSpPr>
+        <p:spPr/>
+        <p:txBody>
+          <a:bodyPr/>
+          <a:lstStyle/>
+          <a:p>
+            <a:pPr>
+              <a:buNone/>
+            </a:pPr>
+            <a:r>
+              <a:rPr lang="en-GB" dirty="0" smtClean="0"/>
+              <a:t>Retrospective</a:t>
+            </a:r>
+            <a:endParaRPr lang="en-GB" dirty="0"/>
+          </a:p>
+        </p:txBody>
+      </p:sp>
+      <p:sp>
+        <p:nvSpPr>
+          <p:cNvPr id="3" name="Content Placeholder 2"/>
+          <p:cNvSpPr>
+            <a:spLocks noGrp="1"/>
+          </p:cNvSpPr>
+          <p:nvPr>
+            <p:ph idx="1"/>
+          </p:nvPr>
+        </p:nvSpPr>
+        <p:spPr/>
+        <p:txBody>
+          <a:bodyPr/>
+          <a:lstStyle/>
+          <a:p>
+            <a:r>
+              <a:rPr lang="en-GB" dirty="0" smtClean="0"/>
+              <a:t>Post-its on the table</a:t>
+            </a:r>
+          </a:p>
+          <a:p>
+            <a:pPr lvl="1"/>
+            <a:r>
+              <a:rPr lang="en-GB" dirty="0" smtClean="0"/>
+              <a:t>What you liked</a:t>
+            </a:r>
+          </a:p>
+          <a:p>
+            <a:pPr lvl="1"/>
+            <a:r>
+              <a:rPr lang="en-GB" dirty="0" smtClean="0"/>
+              <a:t>What you missed</a:t>
+            </a:r>
+          </a:p>
+          <a:p>
+            <a:pPr lvl="1"/>
+            <a:r>
+              <a:rPr lang="en-GB" dirty="0" smtClean="0"/>
+              <a:t>What was confusing</a:t>
+            </a:r>
+          </a:p>
+        </p:txBody>
+      </p:sp>
+    </p:spTree>
+    <p:extLst>
+      <p:ext uri="{BB962C8B-B14F-4D97-AF65-F5344CB8AC3E}">
+        <p14:creationId xmlns:p14="http://schemas.microsoft.com/office/powerpoint/2010/main" val="3467843091"/>
+      </p:ext>
+    </p:extLst>
+  </p:cSld>
+  <p:clrMapOvr>
+    <a:masterClrMapping/>
+  </p:clrMapOvr>
+  <mc:AlternateContent xmlns:mc="http://schemas.openxmlformats.org/markup-compatibility/2006">
+    <mc:Choice xmlns:p14="http://schemas.microsoft.com/office/powerpoint/2010/main" Requires="p14">
+      <p:transition spd="slow" p14:dur="2000"/>
+    </mc:Choice>
+    <mc:Fallback>
+      <p:transition spd="slow"/>
+    </mc:Fallback>
+  </mc:AlternateContent>
+</p:sld>
+</file>
+
+<file path=ppt/slides/slide42.xml><?xml version="1.0" encoding="utf-8"?>
 <p:sld xmlns:a="http://schemas.openxmlformats.org/drawingml/2006/main" xmlns:r="http://schemas.openxmlformats.org/officeDocument/2006/relationships" xmlns:p="http://schemas.openxmlformats.org/presentationml/2006/main">
   <p:cSld name="page41">
     <p:spTree>
@@ -21926,7 +22364,7 @@
 </p:sld>
 </file>
 
-<file path=ppt/slides/slide42.xml><?xml version="1.0" encoding="utf-8"?>
+<file path=ppt/slides/slide43.xml><?xml version="1.0" encoding="utf-8"?>
 <p:sld xmlns:a="http://schemas.openxmlformats.org/drawingml/2006/main" xmlns:r="http://schemas.openxmlformats.org/officeDocument/2006/relationships" xmlns:p="http://schemas.openxmlformats.org/presentationml/2006/main">
   <p:cSld name="page42">
     <p:spTree>
@@ -24533,7 +24971,7 @@
               <a:buNone/>
             </a:pPr>
             <a:r>
-              <a:rPr lang="en-GB" sz="5400"/>
+              <a:rPr lang="en-GB" sz="5400" dirty="0"/>
               <a:t>Inheritance</a:t>
             </a:r>
           </a:p>
@@ -24752,35 +25190,35 @@
           <a:p>
             <a:pPr lvl="0"/>
             <a:r>
-              <a:rPr lang="en-GB"/>
+              <a:rPr lang="en-GB" sz="2800" dirty="0"/>
               <a:t>“Is-A” relationship</a:t>
             </a:r>
           </a:p>
           <a:p>
             <a:pPr lvl="1" rtl="0" hangingPunct="0"/>
             <a:r>
-              <a:rPr lang="en-GB"/>
+              <a:rPr lang="en-GB" sz="2400" dirty="0"/>
               <a:t>A cat is a mammal</a:t>
             </a:r>
           </a:p>
           <a:p>
             <a:pPr lvl="0"/>
             <a:r>
-              <a:rPr lang="en-GB"/>
+              <a:rPr lang="en-GB" sz="2800" dirty="0"/>
               <a:t>Subtype-Polymorphism</a:t>
             </a:r>
           </a:p>
           <a:p>
             <a:pPr lvl="1" rtl="0" hangingPunct="0"/>
             <a:r>
-              <a:rPr lang="en-GB"/>
+              <a:rPr lang="en-GB" sz="2400" dirty="0"/>
               <a:t>aka Sub-classing</a:t>
             </a:r>
           </a:p>
           <a:p>
             <a:pPr lvl="1" rtl="0" hangingPunct="0"/>
             <a:r>
-              <a:rPr lang="en-GB"/>
+              <a:rPr lang="en-GB" sz="2400" dirty="0"/>
               <a:t>Reuse definitions</a:t>
             </a:r>
           </a:p>

</xml_diff>